<commit_message>
Présentation : insertion feature eng
initier un slide pour mettre en perspective le questionnement soulevé features vs model sensitivity : ex. faire coexister des booleens et features numériques
</commit_message>
<xml_diff>
--- a/P5Olist_Présentation_initiale.pptx
+++ b/P5Olist_Présentation_initiale.pptx
@@ -416,7 +416,7 @@
             <a:fld id="{08B9EBBA-996F-894A-B54A-D6246ED52CEA}" type="datetimeFigureOut">
               <a:rPr lang="en-US" dirty="0"/>
               <a:pPr/>
-              <a:t>9/9/2020</a:t>
+              <a:t>9/11/2020</a:t>
             </a:fld>
             <a:endParaRPr lang="en-US" dirty="0"/>
           </a:p>
@@ -731,7 +731,7 @@
             <a:fld id="{18C79C5D-2A6F-F04D-97DA-BEF2467B64E4}" type="datetimeFigureOut">
               <a:rPr lang="en-US" dirty="0"/>
               <a:pPr/>
-              <a:t>9/9/2020</a:t>
+              <a:t>9/11/2020</a:t>
             </a:fld>
             <a:endParaRPr lang="en-US" dirty="0"/>
           </a:p>
@@ -1216,7 +1216,7 @@
             <a:fld id="{8DFA1846-DA80-1C48-A609-854EA85C59AD}" type="datetimeFigureOut">
               <a:rPr lang="en-US" dirty="0"/>
               <a:pPr/>
-              <a:t>9/9/2020</a:t>
+              <a:t>9/11/2020</a:t>
             </a:fld>
             <a:endParaRPr lang="en-US" dirty="0"/>
           </a:p>
@@ -1582,7 +1582,7 @@
             <a:fld id="{FBF54567-0DE4-3F47-BF90-CB84690072F9}" type="datetimeFigureOut">
               <a:rPr lang="en-US" dirty="0"/>
               <a:pPr/>
-              <a:t>9/9/2020</a:t>
+              <a:t>9/11/2020</a:t>
             </a:fld>
             <a:endParaRPr lang="en-US" dirty="0"/>
           </a:p>
@@ -1852,7 +1852,7 @@
             <a:fld id="{C6C52C72-DE31-F449-A4ED-4C594FD91407}" type="datetimeFigureOut">
               <a:rPr lang="en-US" dirty="0"/>
               <a:pPr/>
-              <a:t>9/9/2020</a:t>
+              <a:t>9/11/2020</a:t>
             </a:fld>
             <a:endParaRPr lang="en-US" dirty="0"/>
           </a:p>
@@ -2134,7 +2134,7 @@
             <a:fld id="{ED62726E-379B-B349-9EED-81ED093FA806}" type="datetimeFigureOut">
               <a:rPr lang="en-US" dirty="0"/>
               <a:pPr/>
-              <a:t>9/9/2020</a:t>
+              <a:t>9/11/2020</a:t>
             </a:fld>
             <a:endParaRPr lang="en-US" dirty="0"/>
           </a:p>
@@ -2414,7 +2414,7 @@
             <a:fld id="{9B3A1323-8D79-1946-B0D7-40001CF92E9D}" type="datetimeFigureOut">
               <a:rPr lang="en-US" dirty="0"/>
               <a:pPr/>
-              <a:t>9/9/2020</a:t>
+              <a:t>9/11/2020</a:t>
             </a:fld>
             <a:endParaRPr lang="en-US" dirty="0"/>
           </a:p>
@@ -2754,7 +2754,7 @@
             <a:fld id="{8DFA1846-DA80-1C48-A609-854EA85C59AD}" type="datetimeFigureOut">
               <a:rPr lang="en-US" dirty="0"/>
               <a:pPr/>
-              <a:t>9/9/2020</a:t>
+              <a:t>9/11/2020</a:t>
             </a:fld>
             <a:endParaRPr lang="en-US" dirty="0"/>
           </a:p>
@@ -3090,7 +3090,7 @@
             <a:fld id="{57302355-E14B-8545-A8F8-0FE83CC9D524}" type="datetimeFigureOut">
               <a:rPr lang="en-US" dirty="0"/>
               <a:pPr/>
-              <a:t>9/9/2020</a:t>
+              <a:t>9/11/2020</a:t>
             </a:fld>
             <a:endParaRPr lang="en-US" dirty="0"/>
           </a:p>
@@ -3569,7 +3569,7 @@
             <a:fld id="{02640F58-564D-2B4F-AE67-E407BA4FCF45}" type="datetimeFigureOut">
               <a:rPr lang="en-US" dirty="0"/>
               <a:pPr/>
-              <a:t>9/9/2020</a:t>
+              <a:t>9/11/2020</a:t>
             </a:fld>
             <a:endParaRPr lang="en-US" dirty="0"/>
           </a:p>
@@ -3792,7 +3792,7 @@
             <a:fld id="{F13A34C8-038E-2045-AF43-DF7DBB8E0E9E}" type="datetimeFigureOut">
               <a:rPr lang="en-US" dirty="0"/>
               <a:pPr/>
-              <a:t>9/9/2020</a:t>
+              <a:t>9/11/2020</a:t>
             </a:fld>
             <a:endParaRPr lang="en-US" dirty="0"/>
           </a:p>
@@ -3884,7 +3884,7 @@
             <a:fld id="{8818C68F-D26B-8F47-958C-23B49CF8A634}" type="datetimeFigureOut">
               <a:rPr lang="en-US" dirty="0"/>
               <a:pPr/>
-              <a:t>9/9/2020</a:t>
+              <a:t>9/11/2020</a:t>
             </a:fld>
             <a:endParaRPr lang="en-US" dirty="0"/>
           </a:p>
@@ -4348,7 +4348,7 @@
             <a:fld id="{D0DF5E60-9974-AC48-9591-99C2BB44B7CF}" type="datetimeFigureOut">
               <a:rPr lang="en-US" dirty="0"/>
               <a:pPr/>
-              <a:t>9/9/2020</a:t>
+              <a:t>9/11/2020</a:t>
             </a:fld>
             <a:endParaRPr lang="en-US" dirty="0"/>
           </a:p>
@@ -4658,7 +4658,7 @@
             <a:fld id="{18C79C5D-2A6F-F04D-97DA-BEF2467B64E4}" type="datetimeFigureOut">
               <a:rPr lang="en-US" dirty="0"/>
               <a:pPr/>
-              <a:t>9/9/2020</a:t>
+              <a:t>9/11/2020</a:t>
             </a:fld>
             <a:endParaRPr lang="en-US" dirty="0"/>
           </a:p>
@@ -4925,7 +4925,7 @@
             <a:fld id="{09B482E8-6E0E-1B4F-B1FD-C69DB9E858D9}" type="datetimeFigureOut">
               <a:rPr lang="en-US" dirty="0"/>
               <a:pPr/>
-              <a:t>9/9/2020</a:t>
+              <a:t>9/11/2020</a:t>
             </a:fld>
             <a:endParaRPr lang="en-US" dirty="0"/>
           </a:p>
@@ -12106,7 +12106,7 @@
             </a:r>
             <a:r>
               <a:rPr lang="fr-FR" sz="1400" b="1" dirty="0" err="1"/>
-              <a:t>rational_category</a:t>
+              <a:t>category</a:t>
             </a:r>
             <a:r>
               <a:rPr lang="fr-FR" sz="1400" b="1" dirty="0"/>
@@ -13875,7 +13875,15 @@
             </a:r>
             <a:r>
               <a:rPr lang="fr-FR" dirty="0"/>
-              <a:t> help to </a:t>
+              <a:t> </a:t>
+            </a:r>
+            <a:r>
+              <a:rPr lang="fr-FR" dirty="0" err="1"/>
+              <a:t>provide</a:t>
+            </a:r>
+            <a:r>
+              <a:rPr lang="fr-FR" dirty="0"/>
+              <a:t> to </a:t>
             </a:r>
             <a:r>
               <a:rPr lang="fr-FR" dirty="0" err="1"/>
@@ -13958,7 +13966,7 @@
             </a:r>
             <a:r>
               <a:rPr lang="fr-FR" i="1" dirty="0"/>
-              <a:t>(M </a:t>
+              <a:t>(the M </a:t>
             </a:r>
             <a:r>
               <a:rPr lang="fr-FR" i="1" dirty="0" err="1"/>
@@ -14456,10 +14464,10 @@
         </p:nvGrpSpPr>
         <p:grpSpPr>
           <a:xfrm>
-            <a:off x="-108397" y="2988494"/>
-            <a:ext cx="5430496" cy="1461166"/>
-            <a:chOff x="-89013" y="3035998"/>
-            <a:chExt cx="5430496" cy="1461166"/>
+            <a:off x="-97654" y="2988494"/>
+            <a:ext cx="5419753" cy="1461166"/>
+            <a:chOff x="-78270" y="3035998"/>
+            <a:chExt cx="5419753" cy="1461166"/>
           </a:xfrm>
         </p:grpSpPr>
         <p:sp>
@@ -14604,8 +14612,8 @@
           </p:nvSpPr>
           <p:spPr>
             <a:xfrm>
-              <a:off x="-89013" y="3112169"/>
-              <a:ext cx="3345623" cy="1384995"/>
+              <a:off x="-78270" y="3112169"/>
+              <a:ext cx="3334880" cy="1384995"/>
             </a:xfrm>
             <a:prstGeom prst="rect">
               <a:avLst/>
@@ -15448,13 +15456,16 @@
                     <a:srgbClr val="788896"/>
                   </a:solidFill>
                 </a:rPr>
-                <a:t>main_payment_type_cat</a:t>
+                <a:t>main_payment_type</a:t>
               </a:r>
-              <a:endParaRPr lang="en-US" sz="1400" b="1" u="sng" dirty="0">
-                <a:solidFill>
-                  <a:srgbClr val="788896"/>
-                </a:solidFill>
-              </a:endParaRPr>
+              <a:r>
+                <a:rPr lang="en-US" sz="1400" b="1" u="sng" dirty="0">
+                  <a:solidFill>
+                    <a:srgbClr val="788896"/>
+                  </a:solidFill>
+                </a:rPr>
+                <a:t>(_cat)</a:t>
+              </a:r>
             </a:p>
             <a:p>
               <a:pPr algn="r"/>
@@ -15464,13 +15475,16 @@
                     <a:srgbClr val="788896"/>
                   </a:solidFill>
                 </a:rPr>
-                <a:t>payment_installments_size_cat</a:t>
+                <a:t>payment_installments_size</a:t>
               </a:r>
-              <a:endParaRPr lang="en-US" sz="1400" b="1" u="sng" dirty="0">
-                <a:solidFill>
-                  <a:srgbClr val="788896"/>
-                </a:solidFill>
-              </a:endParaRPr>
+              <a:r>
+                <a:rPr lang="en-US" sz="1400" b="1" u="sng" dirty="0">
+                  <a:solidFill>
+                    <a:srgbClr val="788896"/>
+                  </a:solidFill>
+                </a:rPr>
+                <a:t>(_cat)</a:t>
+              </a:r>
             </a:p>
             <a:p>
               <a:pPr algn="r"/>
@@ -15480,13 +15494,16 @@
                     <a:srgbClr val="788896"/>
                   </a:solidFill>
                 </a:rPr>
-                <a:t>payment_sequence_size_cat</a:t>
+                <a:t>payment_sequence_size</a:t>
               </a:r>
-              <a:endParaRPr lang="en-US" sz="1400" b="1" dirty="0">
-                <a:solidFill>
-                  <a:srgbClr val="788896"/>
-                </a:solidFill>
-              </a:endParaRPr>
+              <a:r>
+                <a:rPr lang="en-US" sz="1400" b="1" dirty="0">
+                  <a:solidFill>
+                    <a:srgbClr val="788896"/>
+                  </a:solidFill>
+                </a:rPr>
+                <a:t>(_cat)</a:t>
+              </a:r>
             </a:p>
             <a:p>
               <a:pPr algn="r"/>
@@ -15552,10 +15569,10 @@
         </p:nvGrpSpPr>
         <p:grpSpPr>
           <a:xfrm>
-            <a:off x="6071757" y="2231869"/>
-            <a:ext cx="4533453" cy="1598151"/>
-            <a:chOff x="6072352" y="2125561"/>
-            <a:chExt cx="4533453" cy="1598151"/>
+            <a:off x="6071757" y="2232430"/>
+            <a:ext cx="4441117" cy="1600438"/>
+            <a:chOff x="6072352" y="2126122"/>
+            <a:chExt cx="4441117" cy="1600438"/>
           </a:xfrm>
         </p:grpSpPr>
         <p:sp>
@@ -15726,8 +15743,8 @@
           </p:nvSpPr>
           <p:spPr>
             <a:xfrm>
-              <a:off x="7952337" y="2125561"/>
-              <a:ext cx="2653468" cy="1384995"/>
+              <a:off x="7860001" y="2126122"/>
+              <a:ext cx="2653468" cy="1600438"/>
             </a:xfrm>
             <a:prstGeom prst="rect">
               <a:avLst/>
@@ -15834,6 +15851,30 @@
                   </a:solidFill>
                 </a:rPr>
                 <a:t>product_size</a:t>
+              </a:r>
+              <a:endParaRPr lang="en-US" sz="1400" i="1" dirty="0">
+                <a:solidFill>
+                  <a:srgbClr val="FFC000"/>
+                </a:solidFill>
+              </a:endParaRPr>
+            </a:p>
+            <a:p>
+              <a:pPr algn="r"/>
+              <a:r>
+                <a:rPr lang="en-US" sz="1400" i="1" dirty="0">
+                  <a:solidFill>
+                    <a:srgbClr val="FFC000"/>
+                  </a:solidFill>
+                </a:rPr>
+                <a:t>? </a:t>
+              </a:r>
+              <a:r>
+                <a:rPr lang="en-US" sz="1400" i="1" dirty="0" err="1">
+                  <a:solidFill>
+                    <a:srgbClr val="FFC000"/>
+                  </a:solidFill>
+                </a:rPr>
+                <a:t>product_density</a:t>
               </a:r>
               <a:endParaRPr lang="en-US" sz="1400" i="1" dirty="0">
                 <a:solidFill>
@@ -16086,13 +16127,16 @@
                     <a:srgbClr val="E8833A"/>
                   </a:solidFill>
                 </a:rPr>
-                <a:t>charmed_price_cat</a:t>
+                <a:t>charmed_price</a:t>
               </a:r>
-              <a:endParaRPr lang="en-US" sz="1400" b="1" u="sng" dirty="0">
-                <a:solidFill>
-                  <a:srgbClr val="E8833A"/>
-                </a:solidFill>
-              </a:endParaRPr>
+              <a:r>
+                <a:rPr lang="en-US" sz="1400" b="1" u="sng" dirty="0">
+                  <a:solidFill>
+                    <a:srgbClr val="E8833A"/>
+                  </a:solidFill>
+                </a:rPr>
+                <a:t>(_cat)</a:t>
+              </a:r>
             </a:p>
             <a:p>
               <a:pPr algn="r"/>
@@ -16327,6 +16371,350 @@
           </p:txBody>
         </p:sp>
       </p:grpSp>
+      <p:sp>
+        <p:nvSpPr>
+          <p:cNvPr id="6" name="ZoneTexte 5">
+            <a:extLst>
+              <a:ext uri="{FF2B5EF4-FFF2-40B4-BE49-F238E27FC236}">
+                <a16:creationId xmlns:a16="http://schemas.microsoft.com/office/drawing/2014/main" id="{54D4C0DC-1FD0-45D3-9729-1297CDC3FAD2}"/>
+              </a:ext>
+            </a:extLst>
+          </p:cNvPr>
+          <p:cNvSpPr txBox="1"/>
+          <p:nvPr/>
+        </p:nvSpPr>
+        <p:spPr>
+          <a:xfrm>
+            <a:off x="7845030" y="6470413"/>
+            <a:ext cx="4257897" cy="307777"/>
+          </a:xfrm>
+          <a:prstGeom prst="rect">
+            <a:avLst/>
+          </a:prstGeom>
+          <a:noFill/>
+        </p:spPr>
+        <p:txBody>
+          <a:bodyPr wrap="none" rtlCol="0">
+            <a:spAutoFit/>
+          </a:bodyPr>
+          <a:lstStyle/>
+          <a:p>
+            <a:r>
+              <a:rPr lang="fr-FR" sz="1400" i="1" dirty="0"/>
+              <a:t>* : </a:t>
+            </a:r>
+            <a:r>
+              <a:rPr lang="fr-FR" sz="1400" i="1" dirty="0" err="1"/>
+              <a:t>Also</a:t>
+            </a:r>
+            <a:r>
+              <a:rPr lang="fr-FR" sz="1400" i="1" dirty="0"/>
+              <a:t> </a:t>
+            </a:r>
+            <a:r>
+              <a:rPr lang="fr-FR" sz="1400" i="1" dirty="0" err="1"/>
+              <a:t>described</a:t>
+            </a:r>
+            <a:r>
+              <a:rPr lang="fr-FR" sz="1400" i="1" dirty="0"/>
+              <a:t> as an ordinal « </a:t>
+            </a:r>
+            <a:r>
+              <a:rPr lang="fr-FR" sz="1400" b="1" i="1" dirty="0" err="1"/>
+              <a:t>level</a:t>
+            </a:r>
+            <a:r>
+              <a:rPr lang="fr-FR" sz="1400" i="1" dirty="0"/>
+              <a:t> » </a:t>
+            </a:r>
+            <a:r>
+              <a:rPr lang="fr-FR" sz="1400" i="1" dirty="0" err="1"/>
+              <a:t>feature</a:t>
+            </a:r>
+            <a:endParaRPr lang="en-US" sz="1400" i="1" dirty="0"/>
+          </a:p>
+        </p:txBody>
+      </p:sp>
+      <p:sp>
+        <p:nvSpPr>
+          <p:cNvPr id="7" name="Accolade fermante 6">
+            <a:extLst>
+              <a:ext uri="{FF2B5EF4-FFF2-40B4-BE49-F238E27FC236}">
+                <a16:creationId xmlns:a16="http://schemas.microsoft.com/office/drawing/2014/main" id="{65CFD7AB-7030-486C-8798-50341CABC602}"/>
+              </a:ext>
+            </a:extLst>
+          </p:cNvPr>
+          <p:cNvSpPr/>
+          <p:nvPr/>
+        </p:nvSpPr>
+        <p:spPr>
+          <a:xfrm>
+            <a:off x="10435747" y="2562840"/>
+            <a:ext cx="183005" cy="511202"/>
+          </a:xfrm>
+          <a:prstGeom prst="rightBrace">
+            <a:avLst/>
+          </a:prstGeom>
+        </p:spPr>
+        <p:style>
+          <a:lnRef idx="1">
+            <a:schemeClr val="accent1"/>
+          </a:lnRef>
+          <a:fillRef idx="0">
+            <a:schemeClr val="accent1"/>
+          </a:fillRef>
+          <a:effectRef idx="0">
+            <a:schemeClr val="accent1"/>
+          </a:effectRef>
+          <a:fontRef idx="minor">
+            <a:schemeClr val="tx1"/>
+          </a:fontRef>
+        </p:style>
+        <p:txBody>
+          <a:bodyPr rtlCol="0" anchor="ctr"/>
+          <a:lstStyle/>
+          <a:p>
+            <a:pPr algn="ctr"/>
+            <a:endParaRPr lang="en-US"/>
+          </a:p>
+        </p:txBody>
+      </p:sp>
+      <p:sp>
+        <p:nvSpPr>
+          <p:cNvPr id="44" name="ZoneTexte 43">
+            <a:extLst>
+              <a:ext uri="{FF2B5EF4-FFF2-40B4-BE49-F238E27FC236}">
+                <a16:creationId xmlns:a16="http://schemas.microsoft.com/office/drawing/2014/main" id="{C02D18DD-D698-4128-B5D2-A6BF2BC833C1}"/>
+              </a:ext>
+            </a:extLst>
+          </p:cNvPr>
+          <p:cNvSpPr txBox="1"/>
+          <p:nvPr/>
+        </p:nvSpPr>
+        <p:spPr>
+          <a:xfrm>
+            <a:off x="9729325" y="2665628"/>
+            <a:ext cx="2474464" cy="276999"/>
+          </a:xfrm>
+          <a:prstGeom prst="rect">
+            <a:avLst/>
+          </a:prstGeom>
+          <a:noFill/>
+        </p:spPr>
+        <p:txBody>
+          <a:bodyPr wrap="square">
+            <a:spAutoFit/>
+          </a:bodyPr>
+          <a:lstStyle/>
+          <a:p>
+            <a:pPr algn="r"/>
+            <a:r>
+              <a:rPr lang="en-US" sz="1200" i="1" dirty="0" err="1">
+                <a:solidFill>
+                  <a:srgbClr val="FFC000"/>
+                </a:solidFill>
+              </a:rPr>
+              <a:t>description_quality</a:t>
+            </a:r>
+            <a:r>
+              <a:rPr lang="en-US" sz="1200" i="1" dirty="0">
+                <a:solidFill>
+                  <a:srgbClr val="FFC000"/>
+                </a:solidFill>
+              </a:rPr>
+              <a:t>?</a:t>
+            </a:r>
+          </a:p>
+        </p:txBody>
+      </p:sp>
+      <p:sp>
+        <p:nvSpPr>
+          <p:cNvPr id="45" name="Accolade fermante 44">
+            <a:extLst>
+              <a:ext uri="{FF2B5EF4-FFF2-40B4-BE49-F238E27FC236}">
+                <a16:creationId xmlns:a16="http://schemas.microsoft.com/office/drawing/2014/main" id="{DC52BA71-D0DE-4E83-B605-BF8F38E389C8}"/>
+              </a:ext>
+            </a:extLst>
+          </p:cNvPr>
+          <p:cNvSpPr/>
+          <p:nvPr/>
+        </p:nvSpPr>
+        <p:spPr>
+          <a:xfrm>
+            <a:off x="10500571" y="3181078"/>
+            <a:ext cx="183005" cy="511202"/>
+          </a:xfrm>
+          <a:prstGeom prst="rightBrace">
+            <a:avLst/>
+          </a:prstGeom>
+        </p:spPr>
+        <p:style>
+          <a:lnRef idx="1">
+            <a:schemeClr val="accent1"/>
+          </a:lnRef>
+          <a:fillRef idx="0">
+            <a:schemeClr val="accent1"/>
+          </a:fillRef>
+          <a:effectRef idx="0">
+            <a:schemeClr val="accent1"/>
+          </a:effectRef>
+          <a:fontRef idx="minor">
+            <a:schemeClr val="tx1"/>
+          </a:fontRef>
+        </p:style>
+        <p:txBody>
+          <a:bodyPr rtlCol="0" anchor="ctr"/>
+          <a:lstStyle/>
+          <a:p>
+            <a:pPr algn="ctr"/>
+            <a:endParaRPr lang="en-US"/>
+          </a:p>
+        </p:txBody>
+      </p:sp>
+      <p:sp>
+        <p:nvSpPr>
+          <p:cNvPr id="46" name="ZoneTexte 45">
+            <a:extLst>
+              <a:ext uri="{FF2B5EF4-FFF2-40B4-BE49-F238E27FC236}">
+                <a16:creationId xmlns:a16="http://schemas.microsoft.com/office/drawing/2014/main" id="{707209AA-A1D2-4BB5-9950-57CF87F16AB0}"/>
+              </a:ext>
+            </a:extLst>
+          </p:cNvPr>
+          <p:cNvSpPr txBox="1"/>
+          <p:nvPr/>
+        </p:nvSpPr>
+        <p:spPr>
+          <a:xfrm>
+            <a:off x="9794149" y="3283866"/>
+            <a:ext cx="1622534" cy="276999"/>
+          </a:xfrm>
+          <a:prstGeom prst="rect">
+            <a:avLst/>
+          </a:prstGeom>
+          <a:noFill/>
+        </p:spPr>
+        <p:txBody>
+          <a:bodyPr wrap="square">
+            <a:spAutoFit/>
+          </a:bodyPr>
+          <a:lstStyle/>
+          <a:p>
+            <a:pPr algn="r"/>
+            <a:r>
+              <a:rPr lang="en-US" sz="1200" i="1" dirty="0"/>
+              <a:t>freight ?</a:t>
+            </a:r>
+          </a:p>
+        </p:txBody>
+      </p:sp>
+      <p:sp>
+        <p:nvSpPr>
+          <p:cNvPr id="47" name="ZoneTexte 46">
+            <a:extLst>
+              <a:ext uri="{FF2B5EF4-FFF2-40B4-BE49-F238E27FC236}">
+                <a16:creationId xmlns:a16="http://schemas.microsoft.com/office/drawing/2014/main" id="{82B6DAAA-EF2A-4347-88AC-D913386986CC}"/>
+              </a:ext>
+            </a:extLst>
+          </p:cNvPr>
+          <p:cNvSpPr txBox="1"/>
+          <p:nvPr/>
+        </p:nvSpPr>
+        <p:spPr>
+          <a:xfrm>
+            <a:off x="9217333" y="4286926"/>
+            <a:ext cx="1622534" cy="276999"/>
+          </a:xfrm>
+          <a:prstGeom prst="rect">
+            <a:avLst/>
+          </a:prstGeom>
+          <a:noFill/>
+        </p:spPr>
+        <p:txBody>
+          <a:bodyPr wrap="square">
+            <a:spAutoFit/>
+          </a:bodyPr>
+          <a:lstStyle/>
+          <a:p>
+            <a:pPr algn="r"/>
+            <a:r>
+              <a:rPr lang="en-US" sz="1200" i="1" dirty="0"/>
+              <a:t>freight ?</a:t>
+            </a:r>
+          </a:p>
+        </p:txBody>
+      </p:sp>
+      <p:sp>
+        <p:nvSpPr>
+          <p:cNvPr id="48" name="ZoneTexte 47">
+            <a:extLst>
+              <a:ext uri="{FF2B5EF4-FFF2-40B4-BE49-F238E27FC236}">
+                <a16:creationId xmlns:a16="http://schemas.microsoft.com/office/drawing/2014/main" id="{35BC936F-959D-4F4E-910E-8E17E63B144F}"/>
+              </a:ext>
+            </a:extLst>
+          </p:cNvPr>
+          <p:cNvSpPr txBox="1"/>
+          <p:nvPr/>
+        </p:nvSpPr>
+        <p:spPr>
+          <a:xfrm>
+            <a:off x="-499444" y="3700861"/>
+            <a:ext cx="1622534" cy="276999"/>
+          </a:xfrm>
+          <a:prstGeom prst="rect">
+            <a:avLst/>
+          </a:prstGeom>
+          <a:noFill/>
+        </p:spPr>
+        <p:txBody>
+          <a:bodyPr wrap="square">
+            <a:spAutoFit/>
+          </a:bodyPr>
+          <a:lstStyle/>
+          <a:p>
+            <a:pPr algn="r"/>
+            <a:r>
+              <a:rPr lang="en-US" sz="1200" i="1" dirty="0"/>
+              <a:t>freight ?</a:t>
+            </a:r>
+          </a:p>
+        </p:txBody>
+      </p:sp>
+      <p:sp>
+        <p:nvSpPr>
+          <p:cNvPr id="49" name="ZoneTexte 48">
+            <a:extLst>
+              <a:ext uri="{FF2B5EF4-FFF2-40B4-BE49-F238E27FC236}">
+                <a16:creationId xmlns:a16="http://schemas.microsoft.com/office/drawing/2014/main" id="{A774448D-1AE7-4143-89C9-DD2BE14C3D11}"/>
+              </a:ext>
+            </a:extLst>
+          </p:cNvPr>
+          <p:cNvSpPr txBox="1"/>
+          <p:nvPr/>
+        </p:nvSpPr>
+        <p:spPr>
+          <a:xfrm>
+            <a:off x="7940387" y="5644399"/>
+            <a:ext cx="1622534" cy="276999"/>
+          </a:xfrm>
+          <a:prstGeom prst="rect">
+            <a:avLst/>
+          </a:prstGeom>
+          <a:noFill/>
+        </p:spPr>
+        <p:txBody>
+          <a:bodyPr wrap="square">
+            <a:spAutoFit/>
+          </a:bodyPr>
+          <a:lstStyle/>
+          <a:p>
+            <a:pPr algn="r"/>
+            <a:r>
+              <a:rPr lang="en-US" sz="1200" i="1" dirty="0"/>
+              <a:t>freight ?</a:t>
+            </a:r>
+          </a:p>
+        </p:txBody>
+      </p:sp>
     </p:spTree>
     <p:extLst>
       <p:ext uri="{BB962C8B-B14F-4D97-AF65-F5344CB8AC3E}">
@@ -17004,11 +17392,11 @@
           <a:p>
             <a:r>
               <a:rPr lang="fr-FR" dirty="0" err="1"/>
-              <a:t>Purchase</a:t>
-            </a:r>
-            <a:r>
-              <a:rPr lang="fr-FR" dirty="0"/>
-              <a:t> Time Zone</a:t>
+              <a:t>Feature</a:t>
+            </a:r>
+            <a:r>
+              <a:rPr lang="fr-FR" dirty="0"/>
+              <a:t> engineering : </a:t>
             </a:r>
             <a:endParaRPr lang="en-US" dirty="0"/>
           </a:p>
@@ -17030,11 +17418,60 @@
             <p:ph idx="1"/>
           </p:nvPr>
         </p:nvSpPr>
-        <p:spPr/>
+        <p:spPr>
+          <a:xfrm>
+            <a:off x="29619" y="1746635"/>
+            <a:ext cx="11787580" cy="499369"/>
+          </a:xfrm>
+        </p:spPr>
         <p:txBody>
           <a:bodyPr/>
           <a:lstStyle/>
           <a:p>
+            <a:r>
+              <a:rPr lang="en-US" sz="1800" b="1" u="sng" dirty="0" err="1">
+                <a:solidFill>
+                  <a:srgbClr val="D3455B"/>
+                </a:solidFill>
+              </a:rPr>
+              <a:t>purchase_time_zone_cat</a:t>
+            </a:r>
+            <a:r>
+              <a:rPr lang="en-US" sz="1800" b="1" dirty="0">
+                <a:solidFill>
+                  <a:srgbClr val="D3455B"/>
+                </a:solidFill>
+              </a:rPr>
+              <a:t> : </a:t>
+            </a:r>
+            <a:r>
+              <a:rPr lang="fr-FR" dirty="0" err="1"/>
+              <a:t>is</a:t>
+            </a:r>
+            <a:r>
+              <a:rPr lang="fr-FR" dirty="0"/>
+              <a:t> </a:t>
+            </a:r>
+            <a:r>
+              <a:rPr lang="fr-FR" dirty="0" err="1"/>
+              <a:t>built</a:t>
+            </a:r>
+            <a:r>
+              <a:rPr lang="fr-FR" dirty="0"/>
+              <a:t> out of  </a:t>
+            </a:r>
+            <a:r>
+              <a:rPr lang="en-US" dirty="0" err="1"/>
+              <a:t>order_purchase_dayofweek</a:t>
+            </a:r>
+            <a:r>
+              <a:rPr lang="en-US" dirty="0"/>
+              <a:t> &amp; </a:t>
+            </a:r>
+            <a:r>
+              <a:rPr lang="en-US" dirty="0" err="1"/>
+              <a:t>order_purchase_hour</a:t>
+            </a:r>
             <a:endParaRPr lang="en-US" dirty="0"/>
           </a:p>
         </p:txBody>
@@ -17061,7 +17498,7 @@
         </p:blipFill>
         <p:spPr>
           <a:xfrm>
-            <a:off x="280989" y="2397480"/>
+            <a:off x="405277" y="2193294"/>
             <a:ext cx="4723804" cy="1643062"/>
           </a:xfrm>
           <a:prstGeom prst="rect">
@@ -17091,7 +17528,7 @@
         </p:blipFill>
         <p:spPr>
           <a:xfrm>
-            <a:off x="7310358" y="2419492"/>
+            <a:off x="7051662" y="2193294"/>
             <a:ext cx="1757363" cy="1643063"/>
           </a:xfrm>
           <a:prstGeom prst="rect">
@@ -17121,14 +17558,1155 @@
         </p:blipFill>
         <p:spPr>
           <a:xfrm>
-            <a:off x="5396221" y="2397480"/>
-            <a:ext cx="1768617" cy="1665075"/>
+            <a:off x="5211691" y="2193292"/>
+            <a:ext cx="1745236" cy="1643063"/>
           </a:xfrm>
           <a:prstGeom prst="rect">
             <a:avLst/>
           </a:prstGeom>
         </p:spPr>
       </p:pic>
+      <p:pic>
+        <p:nvPicPr>
+          <p:cNvPr id="8" name="Image 7">
+            <a:extLst>
+              <a:ext uri="{FF2B5EF4-FFF2-40B4-BE49-F238E27FC236}">
+                <a16:creationId xmlns:a16="http://schemas.microsoft.com/office/drawing/2014/main" id="{71B287B2-4B14-4ECF-AFEB-3A8078ACC1B0}"/>
+              </a:ext>
+            </a:extLst>
+          </p:cNvPr>
+          <p:cNvPicPr>
+            <a:picLocks noChangeAspect="1"/>
+          </p:cNvPicPr>
+          <p:nvPr/>
+        </p:nvPicPr>
+        <p:blipFill>
+          <a:blip r:embed="rId5"/>
+          <a:stretch>
+            <a:fillRect/>
+          </a:stretch>
+        </p:blipFill>
+        <p:spPr>
+          <a:xfrm>
+            <a:off x="8913522" y="2193291"/>
+            <a:ext cx="2532034" cy="1643063"/>
+          </a:xfrm>
+          <a:prstGeom prst="rect">
+            <a:avLst/>
+          </a:prstGeom>
+        </p:spPr>
+      </p:pic>
+      <p:sp>
+        <p:nvSpPr>
+          <p:cNvPr id="9" name="Espace réservé du contenu 2">
+            <a:extLst>
+              <a:ext uri="{FF2B5EF4-FFF2-40B4-BE49-F238E27FC236}">
+                <a16:creationId xmlns:a16="http://schemas.microsoft.com/office/drawing/2014/main" id="{4EB9E11D-40A9-45A0-BFC6-8046B6325BBA}"/>
+              </a:ext>
+            </a:extLst>
+          </p:cNvPr>
+          <p:cNvSpPr txBox="1">
+            <a:spLocks/>
+          </p:cNvSpPr>
+          <p:nvPr/>
+        </p:nvSpPr>
+        <p:spPr>
+          <a:xfrm>
+            <a:off x="-68035" y="6239917"/>
+            <a:ext cx="11787580" cy="499369"/>
+          </a:xfrm>
+          <a:prstGeom prst="rect">
+            <a:avLst/>
+          </a:prstGeom>
+          <a:effectLst>
+            <a:outerShdw blurRad="50800" dir="14400000">
+              <a:srgbClr val="000000">
+                <a:alpha val="40000"/>
+              </a:srgbClr>
+            </a:outerShdw>
+          </a:effectLst>
+        </p:spPr>
+        <p:txBody>
+          <a:bodyPr vert="horz" lIns="91440" tIns="45720" rIns="91440" bIns="45720" rtlCol="0" anchor="ctr">
+            <a:normAutofit fontScale="85000" lnSpcReduction="10000"/>
+          </a:bodyPr>
+          <a:lstStyle>
+            <a:lvl1pPr marL="342900" indent="-342900" algn="l" defTabSz="457200" rtl="0" eaLnBrk="1" latinLnBrk="0" hangingPunct="1">
+              <a:spcBef>
+                <a:spcPct val="20000"/>
+              </a:spcBef>
+              <a:spcAft>
+                <a:spcPts val="600"/>
+              </a:spcAft>
+              <a:buClr>
+                <a:schemeClr val="accent1"/>
+              </a:buClr>
+              <a:buFont typeface="Wingdings 2" charset="2"/>
+              <a:buChar char=""/>
+              <a:defRPr sz="1800" kern="1200">
+                <a:solidFill>
+                  <a:schemeClr val="tx1"/>
+                </a:solidFill>
+                <a:latin typeface="+mn-lt"/>
+                <a:ea typeface="+mn-ea"/>
+                <a:cs typeface="+mn-cs"/>
+              </a:defRPr>
+            </a:lvl1pPr>
+            <a:lvl2pPr marL="742950" indent="-285750" algn="l" defTabSz="457200" rtl="0" eaLnBrk="1" latinLnBrk="0" hangingPunct="1">
+              <a:spcBef>
+                <a:spcPct val="20000"/>
+              </a:spcBef>
+              <a:spcAft>
+                <a:spcPts val="600"/>
+              </a:spcAft>
+              <a:buClr>
+                <a:schemeClr val="accent1"/>
+              </a:buClr>
+              <a:buFont typeface="Wingdings 2" charset="2"/>
+              <a:buChar char=""/>
+              <a:defRPr sz="1600" kern="1200">
+                <a:solidFill>
+                  <a:schemeClr val="tx1"/>
+                </a:solidFill>
+                <a:latin typeface="+mn-lt"/>
+                <a:ea typeface="+mn-ea"/>
+                <a:cs typeface="+mn-cs"/>
+              </a:defRPr>
+            </a:lvl2pPr>
+            <a:lvl3pPr marL="1143000" indent="-228600" algn="l" defTabSz="457200" rtl="0" eaLnBrk="1" latinLnBrk="0" hangingPunct="1">
+              <a:spcBef>
+                <a:spcPct val="20000"/>
+              </a:spcBef>
+              <a:spcAft>
+                <a:spcPts val="600"/>
+              </a:spcAft>
+              <a:buClr>
+                <a:schemeClr val="accent1"/>
+              </a:buClr>
+              <a:buFont typeface="Wingdings 2" charset="2"/>
+              <a:buChar char=""/>
+              <a:defRPr sz="1400" kern="1200">
+                <a:solidFill>
+                  <a:schemeClr val="tx1"/>
+                </a:solidFill>
+                <a:latin typeface="+mn-lt"/>
+                <a:ea typeface="+mn-ea"/>
+                <a:cs typeface="+mn-cs"/>
+              </a:defRPr>
+            </a:lvl3pPr>
+            <a:lvl4pPr marL="1600200" indent="-228600" algn="l" defTabSz="457200" rtl="0" eaLnBrk="1" latinLnBrk="0" hangingPunct="1">
+              <a:spcBef>
+                <a:spcPct val="20000"/>
+              </a:spcBef>
+              <a:spcAft>
+                <a:spcPts val="600"/>
+              </a:spcAft>
+              <a:buClr>
+                <a:schemeClr val="accent1"/>
+              </a:buClr>
+              <a:buFont typeface="Wingdings 2" charset="2"/>
+              <a:buChar char=""/>
+              <a:defRPr sz="1200" kern="1200">
+                <a:solidFill>
+                  <a:schemeClr val="tx1"/>
+                </a:solidFill>
+                <a:latin typeface="+mn-lt"/>
+                <a:ea typeface="+mn-ea"/>
+                <a:cs typeface="+mn-cs"/>
+              </a:defRPr>
+            </a:lvl4pPr>
+            <a:lvl5pPr marL="2057400" indent="-228600" algn="l" defTabSz="457200" rtl="0" eaLnBrk="1" latinLnBrk="0" hangingPunct="1">
+              <a:spcBef>
+                <a:spcPct val="20000"/>
+              </a:spcBef>
+              <a:spcAft>
+                <a:spcPts val="600"/>
+              </a:spcAft>
+              <a:buClr>
+                <a:schemeClr val="accent1"/>
+              </a:buClr>
+              <a:buFont typeface="Wingdings 2" charset="2"/>
+              <a:buChar char=""/>
+              <a:defRPr sz="1200" kern="1200">
+                <a:solidFill>
+                  <a:schemeClr val="tx1"/>
+                </a:solidFill>
+                <a:latin typeface="+mn-lt"/>
+                <a:ea typeface="+mn-ea"/>
+                <a:cs typeface="+mn-cs"/>
+              </a:defRPr>
+            </a:lvl5pPr>
+            <a:lvl6pPr marL="2400000" indent="-228600" algn="l" defTabSz="457200" rtl="0" eaLnBrk="1" latinLnBrk="0" hangingPunct="1">
+              <a:spcBef>
+                <a:spcPct val="20000"/>
+              </a:spcBef>
+              <a:spcAft>
+                <a:spcPts val="600"/>
+              </a:spcAft>
+              <a:buClr>
+                <a:schemeClr val="accent1"/>
+              </a:buClr>
+              <a:buFont typeface="Wingdings 2" charset="2"/>
+              <a:buChar char=""/>
+              <a:defRPr sz="1200" kern="1200">
+                <a:solidFill>
+                  <a:schemeClr val="tx1"/>
+                </a:solidFill>
+                <a:latin typeface="+mn-lt"/>
+                <a:ea typeface="+mn-ea"/>
+                <a:cs typeface="+mn-cs"/>
+              </a:defRPr>
+            </a:lvl6pPr>
+            <a:lvl7pPr marL="2800000" indent="-228600" algn="l" defTabSz="457200" rtl="0" eaLnBrk="1" latinLnBrk="0" hangingPunct="1">
+              <a:spcBef>
+                <a:spcPct val="20000"/>
+              </a:spcBef>
+              <a:spcAft>
+                <a:spcPts val="600"/>
+              </a:spcAft>
+              <a:buClr>
+                <a:schemeClr val="accent1"/>
+              </a:buClr>
+              <a:buFont typeface="Wingdings 2" charset="2"/>
+              <a:buChar char=""/>
+              <a:defRPr sz="1200" kern="1200">
+                <a:solidFill>
+                  <a:schemeClr val="tx1"/>
+                </a:solidFill>
+                <a:latin typeface="+mn-lt"/>
+                <a:ea typeface="+mn-ea"/>
+                <a:cs typeface="+mn-cs"/>
+              </a:defRPr>
+            </a:lvl7pPr>
+            <a:lvl8pPr marL="3200000" indent="-228600" algn="l" defTabSz="457200" rtl="0" eaLnBrk="1" latinLnBrk="0" hangingPunct="1">
+              <a:spcBef>
+                <a:spcPct val="20000"/>
+              </a:spcBef>
+              <a:spcAft>
+                <a:spcPts val="600"/>
+              </a:spcAft>
+              <a:buClr>
+                <a:schemeClr val="accent1"/>
+              </a:buClr>
+              <a:buFont typeface="Wingdings 2" charset="2"/>
+              <a:buChar char=""/>
+              <a:defRPr sz="1200" kern="1200">
+                <a:solidFill>
+                  <a:schemeClr val="tx1"/>
+                </a:solidFill>
+                <a:latin typeface="+mn-lt"/>
+                <a:ea typeface="+mn-ea"/>
+                <a:cs typeface="+mn-cs"/>
+              </a:defRPr>
+            </a:lvl8pPr>
+            <a:lvl9pPr marL="3600000" indent="-228600" algn="l" defTabSz="457200" rtl="0" eaLnBrk="1" latinLnBrk="0" hangingPunct="1">
+              <a:spcBef>
+                <a:spcPct val="20000"/>
+              </a:spcBef>
+              <a:spcAft>
+                <a:spcPts val="600"/>
+              </a:spcAft>
+              <a:buClr>
+                <a:schemeClr val="accent1"/>
+              </a:buClr>
+              <a:buFont typeface="Wingdings 2" charset="2"/>
+              <a:buChar char=""/>
+              <a:defRPr sz="1200" kern="1200">
+                <a:solidFill>
+                  <a:schemeClr val="tx1"/>
+                </a:solidFill>
+                <a:latin typeface="+mn-lt"/>
+                <a:ea typeface="+mn-ea"/>
+                <a:cs typeface="+mn-cs"/>
+              </a:defRPr>
+            </a:lvl9pPr>
+          </a:lstStyle>
+          <a:p>
+            <a:r>
+              <a:rPr lang="fr-FR" b="1" dirty="0"/>
+              <a:t>_</a:t>
+            </a:r>
+            <a:r>
+              <a:rPr lang="fr-FR" b="1" dirty="0" err="1"/>
+              <a:t>lvl</a:t>
+            </a:r>
+            <a:r>
+              <a:rPr lang="fr-FR" b="1" dirty="0"/>
+              <a:t> </a:t>
+            </a:r>
+            <a:r>
+              <a:rPr lang="fr-FR" dirty="0"/>
+              <a:t>are </a:t>
+            </a:r>
+            <a:r>
+              <a:rPr lang="fr-FR" dirty="0" err="1"/>
+              <a:t>qcut</a:t>
+            </a:r>
+            <a:r>
+              <a:rPr lang="fr-FR" dirty="0"/>
+              <a:t> of </a:t>
+            </a:r>
+            <a:r>
+              <a:rPr lang="fr-FR" dirty="0" err="1"/>
+              <a:t>numerical</a:t>
+            </a:r>
+            <a:r>
+              <a:rPr lang="fr-FR" dirty="0"/>
+              <a:t> : </a:t>
+            </a:r>
+            <a:r>
+              <a:rPr lang="fr-FR" dirty="0" err="1"/>
+              <a:t>valuable</a:t>
+            </a:r>
+            <a:r>
+              <a:rPr lang="fr-FR" dirty="0"/>
+              <a:t> for cluster </a:t>
+            </a:r>
+            <a:r>
+              <a:rPr lang="fr-FR" dirty="0" err="1"/>
+              <a:t>descripton</a:t>
+            </a:r>
+            <a:r>
+              <a:rPr lang="fr-FR" dirty="0"/>
+              <a:t>, for </a:t>
+            </a:r>
+            <a:r>
+              <a:rPr lang="fr-FR" dirty="0" err="1"/>
+              <a:t>Kmode</a:t>
+            </a:r>
+            <a:r>
+              <a:rPr lang="fr-FR" dirty="0"/>
+              <a:t> technique or in case of </a:t>
+            </a:r>
+            <a:r>
+              <a:rPr lang="fr-FR" dirty="0" err="1"/>
+              <a:t>highly</a:t>
+            </a:r>
+            <a:r>
+              <a:rPr lang="fr-FR" dirty="0"/>
+              <a:t> </a:t>
+            </a:r>
+            <a:r>
+              <a:rPr lang="fr-FR" dirty="0" err="1"/>
+              <a:t>unbalanced</a:t>
+            </a:r>
+            <a:r>
+              <a:rPr lang="fr-FR" dirty="0"/>
+              <a:t> values</a:t>
+            </a:r>
+            <a:endParaRPr lang="en-US" dirty="0"/>
+          </a:p>
+        </p:txBody>
+      </p:sp>
+      <p:sp>
+        <p:nvSpPr>
+          <p:cNvPr id="11" name="Espace réservé du contenu 2">
+            <a:extLst>
+              <a:ext uri="{FF2B5EF4-FFF2-40B4-BE49-F238E27FC236}">
+                <a16:creationId xmlns:a16="http://schemas.microsoft.com/office/drawing/2014/main" id="{E27E862E-2645-46A0-82ED-319AF3E94ED1}"/>
+              </a:ext>
+            </a:extLst>
+          </p:cNvPr>
+          <p:cNvSpPr txBox="1">
+            <a:spLocks/>
+          </p:cNvSpPr>
+          <p:nvPr/>
+        </p:nvSpPr>
+        <p:spPr>
+          <a:xfrm>
+            <a:off x="-8851" y="5262328"/>
+            <a:ext cx="11787580" cy="606922"/>
+          </a:xfrm>
+          <a:prstGeom prst="rect">
+            <a:avLst/>
+          </a:prstGeom>
+          <a:effectLst>
+            <a:outerShdw blurRad="50800" dir="14400000">
+              <a:srgbClr val="000000">
+                <a:alpha val="40000"/>
+              </a:srgbClr>
+            </a:outerShdw>
+          </a:effectLst>
+        </p:spPr>
+        <p:txBody>
+          <a:bodyPr vert="horz" lIns="91440" tIns="45720" rIns="91440" bIns="45720" rtlCol="0" anchor="ctr">
+            <a:normAutofit fontScale="70000" lnSpcReduction="20000"/>
+          </a:bodyPr>
+          <a:lstStyle>
+            <a:lvl1pPr marL="342900" indent="-342900" algn="l" defTabSz="457200" rtl="0" eaLnBrk="1" latinLnBrk="0" hangingPunct="1">
+              <a:spcBef>
+                <a:spcPct val="20000"/>
+              </a:spcBef>
+              <a:spcAft>
+                <a:spcPts val="600"/>
+              </a:spcAft>
+              <a:buClr>
+                <a:schemeClr val="accent1"/>
+              </a:buClr>
+              <a:buFont typeface="Wingdings 2" charset="2"/>
+              <a:buChar char=""/>
+              <a:defRPr sz="1800" kern="1200">
+                <a:solidFill>
+                  <a:schemeClr val="tx1"/>
+                </a:solidFill>
+                <a:latin typeface="+mn-lt"/>
+                <a:ea typeface="+mn-ea"/>
+                <a:cs typeface="+mn-cs"/>
+              </a:defRPr>
+            </a:lvl1pPr>
+            <a:lvl2pPr marL="742950" indent="-285750" algn="l" defTabSz="457200" rtl="0" eaLnBrk="1" latinLnBrk="0" hangingPunct="1">
+              <a:spcBef>
+                <a:spcPct val="20000"/>
+              </a:spcBef>
+              <a:spcAft>
+                <a:spcPts val="600"/>
+              </a:spcAft>
+              <a:buClr>
+                <a:schemeClr val="accent1"/>
+              </a:buClr>
+              <a:buFont typeface="Wingdings 2" charset="2"/>
+              <a:buChar char=""/>
+              <a:defRPr sz="1600" kern="1200">
+                <a:solidFill>
+                  <a:schemeClr val="tx1"/>
+                </a:solidFill>
+                <a:latin typeface="+mn-lt"/>
+                <a:ea typeface="+mn-ea"/>
+                <a:cs typeface="+mn-cs"/>
+              </a:defRPr>
+            </a:lvl2pPr>
+            <a:lvl3pPr marL="1143000" indent="-228600" algn="l" defTabSz="457200" rtl="0" eaLnBrk="1" latinLnBrk="0" hangingPunct="1">
+              <a:spcBef>
+                <a:spcPct val="20000"/>
+              </a:spcBef>
+              <a:spcAft>
+                <a:spcPts val="600"/>
+              </a:spcAft>
+              <a:buClr>
+                <a:schemeClr val="accent1"/>
+              </a:buClr>
+              <a:buFont typeface="Wingdings 2" charset="2"/>
+              <a:buChar char=""/>
+              <a:defRPr sz="1400" kern="1200">
+                <a:solidFill>
+                  <a:schemeClr val="tx1"/>
+                </a:solidFill>
+                <a:latin typeface="+mn-lt"/>
+                <a:ea typeface="+mn-ea"/>
+                <a:cs typeface="+mn-cs"/>
+              </a:defRPr>
+            </a:lvl3pPr>
+            <a:lvl4pPr marL="1600200" indent="-228600" algn="l" defTabSz="457200" rtl="0" eaLnBrk="1" latinLnBrk="0" hangingPunct="1">
+              <a:spcBef>
+                <a:spcPct val="20000"/>
+              </a:spcBef>
+              <a:spcAft>
+                <a:spcPts val="600"/>
+              </a:spcAft>
+              <a:buClr>
+                <a:schemeClr val="accent1"/>
+              </a:buClr>
+              <a:buFont typeface="Wingdings 2" charset="2"/>
+              <a:buChar char=""/>
+              <a:defRPr sz="1200" kern="1200">
+                <a:solidFill>
+                  <a:schemeClr val="tx1"/>
+                </a:solidFill>
+                <a:latin typeface="+mn-lt"/>
+                <a:ea typeface="+mn-ea"/>
+                <a:cs typeface="+mn-cs"/>
+              </a:defRPr>
+            </a:lvl4pPr>
+            <a:lvl5pPr marL="2057400" indent="-228600" algn="l" defTabSz="457200" rtl="0" eaLnBrk="1" latinLnBrk="0" hangingPunct="1">
+              <a:spcBef>
+                <a:spcPct val="20000"/>
+              </a:spcBef>
+              <a:spcAft>
+                <a:spcPts val="600"/>
+              </a:spcAft>
+              <a:buClr>
+                <a:schemeClr val="accent1"/>
+              </a:buClr>
+              <a:buFont typeface="Wingdings 2" charset="2"/>
+              <a:buChar char=""/>
+              <a:defRPr sz="1200" kern="1200">
+                <a:solidFill>
+                  <a:schemeClr val="tx1"/>
+                </a:solidFill>
+                <a:latin typeface="+mn-lt"/>
+                <a:ea typeface="+mn-ea"/>
+                <a:cs typeface="+mn-cs"/>
+              </a:defRPr>
+            </a:lvl5pPr>
+            <a:lvl6pPr marL="2400000" indent="-228600" algn="l" defTabSz="457200" rtl="0" eaLnBrk="1" latinLnBrk="0" hangingPunct="1">
+              <a:spcBef>
+                <a:spcPct val="20000"/>
+              </a:spcBef>
+              <a:spcAft>
+                <a:spcPts val="600"/>
+              </a:spcAft>
+              <a:buClr>
+                <a:schemeClr val="accent1"/>
+              </a:buClr>
+              <a:buFont typeface="Wingdings 2" charset="2"/>
+              <a:buChar char=""/>
+              <a:defRPr sz="1200" kern="1200">
+                <a:solidFill>
+                  <a:schemeClr val="tx1"/>
+                </a:solidFill>
+                <a:latin typeface="+mn-lt"/>
+                <a:ea typeface="+mn-ea"/>
+                <a:cs typeface="+mn-cs"/>
+              </a:defRPr>
+            </a:lvl6pPr>
+            <a:lvl7pPr marL="2800000" indent="-228600" algn="l" defTabSz="457200" rtl="0" eaLnBrk="1" latinLnBrk="0" hangingPunct="1">
+              <a:spcBef>
+                <a:spcPct val="20000"/>
+              </a:spcBef>
+              <a:spcAft>
+                <a:spcPts val="600"/>
+              </a:spcAft>
+              <a:buClr>
+                <a:schemeClr val="accent1"/>
+              </a:buClr>
+              <a:buFont typeface="Wingdings 2" charset="2"/>
+              <a:buChar char=""/>
+              <a:defRPr sz="1200" kern="1200">
+                <a:solidFill>
+                  <a:schemeClr val="tx1"/>
+                </a:solidFill>
+                <a:latin typeface="+mn-lt"/>
+                <a:ea typeface="+mn-ea"/>
+                <a:cs typeface="+mn-cs"/>
+              </a:defRPr>
+            </a:lvl7pPr>
+            <a:lvl8pPr marL="3200000" indent="-228600" algn="l" defTabSz="457200" rtl="0" eaLnBrk="1" latinLnBrk="0" hangingPunct="1">
+              <a:spcBef>
+                <a:spcPct val="20000"/>
+              </a:spcBef>
+              <a:spcAft>
+                <a:spcPts val="600"/>
+              </a:spcAft>
+              <a:buClr>
+                <a:schemeClr val="accent1"/>
+              </a:buClr>
+              <a:buFont typeface="Wingdings 2" charset="2"/>
+              <a:buChar char=""/>
+              <a:defRPr sz="1200" kern="1200">
+                <a:solidFill>
+                  <a:schemeClr val="tx1"/>
+                </a:solidFill>
+                <a:latin typeface="+mn-lt"/>
+                <a:ea typeface="+mn-ea"/>
+                <a:cs typeface="+mn-cs"/>
+              </a:defRPr>
+            </a:lvl8pPr>
+            <a:lvl9pPr marL="3600000" indent="-228600" algn="l" defTabSz="457200" rtl="0" eaLnBrk="1" latinLnBrk="0" hangingPunct="1">
+              <a:spcBef>
+                <a:spcPct val="20000"/>
+              </a:spcBef>
+              <a:spcAft>
+                <a:spcPts val="600"/>
+              </a:spcAft>
+              <a:buClr>
+                <a:schemeClr val="accent1"/>
+              </a:buClr>
+              <a:buFont typeface="Wingdings 2" charset="2"/>
+              <a:buChar char=""/>
+              <a:defRPr sz="1200" kern="1200">
+                <a:solidFill>
+                  <a:schemeClr val="tx1"/>
+                </a:solidFill>
+                <a:latin typeface="+mn-lt"/>
+                <a:ea typeface="+mn-ea"/>
+                <a:cs typeface="+mn-cs"/>
+              </a:defRPr>
+            </a:lvl9pPr>
+          </a:lstStyle>
+          <a:p>
+            <a:pPr marL="0" indent="0">
+              <a:buNone/>
+            </a:pPr>
+            <a:r>
+              <a:rPr lang="en-US" dirty="0"/>
+              <a:t>A few features are available a</a:t>
+            </a:r>
+            <a:r>
+              <a:rPr lang="en-US" sz="1800" dirty="0"/>
+              <a:t>bout “freight”, linked together : </a:t>
+            </a:r>
+          </a:p>
+          <a:p>
+            <a:r>
+              <a:rPr lang="en-US" sz="1800" b="1" u="sng" dirty="0" err="1">
+                <a:solidFill>
+                  <a:srgbClr val="2C88D9"/>
+                </a:solidFill>
+              </a:rPr>
+              <a:t>cust_sell_dist</a:t>
+            </a:r>
+            <a:r>
+              <a:rPr lang="en-US" sz="1800" b="1" dirty="0">
+                <a:solidFill>
+                  <a:srgbClr val="2C88D9"/>
+                </a:solidFill>
+              </a:rPr>
+              <a:t> : </a:t>
+            </a:r>
+            <a:r>
+              <a:rPr lang="fr-FR" dirty="0"/>
+              <a:t>the distance </a:t>
+            </a:r>
+            <a:r>
+              <a:rPr lang="fr-FR" dirty="0" err="1"/>
+              <a:t>computed</a:t>
+            </a:r>
+            <a:r>
+              <a:rPr lang="fr-FR" dirty="0"/>
+              <a:t> </a:t>
+            </a:r>
+            <a:r>
+              <a:rPr lang="fr-FR" dirty="0" err="1"/>
+              <a:t>from</a:t>
+            </a:r>
+            <a:r>
+              <a:rPr lang="fr-FR" dirty="0"/>
+              <a:t> </a:t>
+            </a:r>
+            <a:r>
+              <a:rPr lang="fr-FR" dirty="0" err="1"/>
+              <a:t>geolocation</a:t>
+            </a:r>
+            <a:endParaRPr lang="fr-FR" dirty="0"/>
+          </a:p>
+          <a:p>
+            <a:endParaRPr lang="fr-FR" dirty="0"/>
+          </a:p>
+          <a:p>
+            <a:endParaRPr lang="en-US" dirty="0"/>
+          </a:p>
+        </p:txBody>
+      </p:sp>
+      <p:sp>
+        <p:nvSpPr>
+          <p:cNvPr id="12" name="Espace réservé du contenu 2">
+            <a:extLst>
+              <a:ext uri="{FF2B5EF4-FFF2-40B4-BE49-F238E27FC236}">
+                <a16:creationId xmlns:a16="http://schemas.microsoft.com/office/drawing/2014/main" id="{EB9E2526-7D46-4FC0-94E7-D6F287783B84}"/>
+              </a:ext>
+            </a:extLst>
+          </p:cNvPr>
+          <p:cNvSpPr txBox="1">
+            <a:spLocks/>
+          </p:cNvSpPr>
+          <p:nvPr/>
+        </p:nvSpPr>
+        <p:spPr>
+          <a:xfrm>
+            <a:off x="-68035" y="3889068"/>
+            <a:ext cx="11787580" cy="499369"/>
+          </a:xfrm>
+          <a:prstGeom prst="rect">
+            <a:avLst/>
+          </a:prstGeom>
+          <a:effectLst>
+            <a:outerShdw blurRad="50800" dir="14400000">
+              <a:srgbClr val="000000">
+                <a:alpha val="40000"/>
+              </a:srgbClr>
+            </a:outerShdw>
+          </a:effectLst>
+        </p:spPr>
+        <p:txBody>
+          <a:bodyPr vert="horz" lIns="91440" tIns="45720" rIns="91440" bIns="45720" rtlCol="0" anchor="ctr">
+            <a:normAutofit/>
+          </a:bodyPr>
+          <a:lstStyle>
+            <a:lvl1pPr marL="342900" indent="-342900" algn="l" defTabSz="457200" rtl="0" eaLnBrk="1" latinLnBrk="0" hangingPunct="1">
+              <a:spcBef>
+                <a:spcPct val="20000"/>
+              </a:spcBef>
+              <a:spcAft>
+                <a:spcPts val="600"/>
+              </a:spcAft>
+              <a:buClr>
+                <a:schemeClr val="accent1"/>
+              </a:buClr>
+              <a:buFont typeface="Wingdings 2" charset="2"/>
+              <a:buChar char=""/>
+              <a:defRPr sz="1800" kern="1200">
+                <a:solidFill>
+                  <a:schemeClr val="tx1"/>
+                </a:solidFill>
+                <a:latin typeface="+mn-lt"/>
+                <a:ea typeface="+mn-ea"/>
+                <a:cs typeface="+mn-cs"/>
+              </a:defRPr>
+            </a:lvl1pPr>
+            <a:lvl2pPr marL="742950" indent="-285750" algn="l" defTabSz="457200" rtl="0" eaLnBrk="1" latinLnBrk="0" hangingPunct="1">
+              <a:spcBef>
+                <a:spcPct val="20000"/>
+              </a:spcBef>
+              <a:spcAft>
+                <a:spcPts val="600"/>
+              </a:spcAft>
+              <a:buClr>
+                <a:schemeClr val="accent1"/>
+              </a:buClr>
+              <a:buFont typeface="Wingdings 2" charset="2"/>
+              <a:buChar char=""/>
+              <a:defRPr sz="1600" kern="1200">
+                <a:solidFill>
+                  <a:schemeClr val="tx1"/>
+                </a:solidFill>
+                <a:latin typeface="+mn-lt"/>
+                <a:ea typeface="+mn-ea"/>
+                <a:cs typeface="+mn-cs"/>
+              </a:defRPr>
+            </a:lvl2pPr>
+            <a:lvl3pPr marL="1143000" indent="-228600" algn="l" defTabSz="457200" rtl="0" eaLnBrk="1" latinLnBrk="0" hangingPunct="1">
+              <a:spcBef>
+                <a:spcPct val="20000"/>
+              </a:spcBef>
+              <a:spcAft>
+                <a:spcPts val="600"/>
+              </a:spcAft>
+              <a:buClr>
+                <a:schemeClr val="accent1"/>
+              </a:buClr>
+              <a:buFont typeface="Wingdings 2" charset="2"/>
+              <a:buChar char=""/>
+              <a:defRPr sz="1400" kern="1200">
+                <a:solidFill>
+                  <a:schemeClr val="tx1"/>
+                </a:solidFill>
+                <a:latin typeface="+mn-lt"/>
+                <a:ea typeface="+mn-ea"/>
+                <a:cs typeface="+mn-cs"/>
+              </a:defRPr>
+            </a:lvl3pPr>
+            <a:lvl4pPr marL="1600200" indent="-228600" algn="l" defTabSz="457200" rtl="0" eaLnBrk="1" latinLnBrk="0" hangingPunct="1">
+              <a:spcBef>
+                <a:spcPct val="20000"/>
+              </a:spcBef>
+              <a:spcAft>
+                <a:spcPts val="600"/>
+              </a:spcAft>
+              <a:buClr>
+                <a:schemeClr val="accent1"/>
+              </a:buClr>
+              <a:buFont typeface="Wingdings 2" charset="2"/>
+              <a:buChar char=""/>
+              <a:defRPr sz="1200" kern="1200">
+                <a:solidFill>
+                  <a:schemeClr val="tx1"/>
+                </a:solidFill>
+                <a:latin typeface="+mn-lt"/>
+                <a:ea typeface="+mn-ea"/>
+                <a:cs typeface="+mn-cs"/>
+              </a:defRPr>
+            </a:lvl4pPr>
+            <a:lvl5pPr marL="2057400" indent="-228600" algn="l" defTabSz="457200" rtl="0" eaLnBrk="1" latinLnBrk="0" hangingPunct="1">
+              <a:spcBef>
+                <a:spcPct val="20000"/>
+              </a:spcBef>
+              <a:spcAft>
+                <a:spcPts val="600"/>
+              </a:spcAft>
+              <a:buClr>
+                <a:schemeClr val="accent1"/>
+              </a:buClr>
+              <a:buFont typeface="Wingdings 2" charset="2"/>
+              <a:buChar char=""/>
+              <a:defRPr sz="1200" kern="1200">
+                <a:solidFill>
+                  <a:schemeClr val="tx1"/>
+                </a:solidFill>
+                <a:latin typeface="+mn-lt"/>
+                <a:ea typeface="+mn-ea"/>
+                <a:cs typeface="+mn-cs"/>
+              </a:defRPr>
+            </a:lvl5pPr>
+            <a:lvl6pPr marL="2400000" indent="-228600" algn="l" defTabSz="457200" rtl="0" eaLnBrk="1" latinLnBrk="0" hangingPunct="1">
+              <a:spcBef>
+                <a:spcPct val="20000"/>
+              </a:spcBef>
+              <a:spcAft>
+                <a:spcPts val="600"/>
+              </a:spcAft>
+              <a:buClr>
+                <a:schemeClr val="accent1"/>
+              </a:buClr>
+              <a:buFont typeface="Wingdings 2" charset="2"/>
+              <a:buChar char=""/>
+              <a:defRPr sz="1200" kern="1200">
+                <a:solidFill>
+                  <a:schemeClr val="tx1"/>
+                </a:solidFill>
+                <a:latin typeface="+mn-lt"/>
+                <a:ea typeface="+mn-ea"/>
+                <a:cs typeface="+mn-cs"/>
+              </a:defRPr>
+            </a:lvl6pPr>
+            <a:lvl7pPr marL="2800000" indent="-228600" algn="l" defTabSz="457200" rtl="0" eaLnBrk="1" latinLnBrk="0" hangingPunct="1">
+              <a:spcBef>
+                <a:spcPct val="20000"/>
+              </a:spcBef>
+              <a:spcAft>
+                <a:spcPts val="600"/>
+              </a:spcAft>
+              <a:buClr>
+                <a:schemeClr val="accent1"/>
+              </a:buClr>
+              <a:buFont typeface="Wingdings 2" charset="2"/>
+              <a:buChar char=""/>
+              <a:defRPr sz="1200" kern="1200">
+                <a:solidFill>
+                  <a:schemeClr val="tx1"/>
+                </a:solidFill>
+                <a:latin typeface="+mn-lt"/>
+                <a:ea typeface="+mn-ea"/>
+                <a:cs typeface="+mn-cs"/>
+              </a:defRPr>
+            </a:lvl7pPr>
+            <a:lvl8pPr marL="3200000" indent="-228600" algn="l" defTabSz="457200" rtl="0" eaLnBrk="1" latinLnBrk="0" hangingPunct="1">
+              <a:spcBef>
+                <a:spcPct val="20000"/>
+              </a:spcBef>
+              <a:spcAft>
+                <a:spcPts val="600"/>
+              </a:spcAft>
+              <a:buClr>
+                <a:schemeClr val="accent1"/>
+              </a:buClr>
+              <a:buFont typeface="Wingdings 2" charset="2"/>
+              <a:buChar char=""/>
+              <a:defRPr sz="1200" kern="1200">
+                <a:solidFill>
+                  <a:schemeClr val="tx1"/>
+                </a:solidFill>
+                <a:latin typeface="+mn-lt"/>
+                <a:ea typeface="+mn-ea"/>
+                <a:cs typeface="+mn-cs"/>
+              </a:defRPr>
+            </a:lvl8pPr>
+            <a:lvl9pPr marL="3600000" indent="-228600" algn="l" defTabSz="457200" rtl="0" eaLnBrk="1" latinLnBrk="0" hangingPunct="1">
+              <a:spcBef>
+                <a:spcPct val="20000"/>
+              </a:spcBef>
+              <a:spcAft>
+                <a:spcPts val="600"/>
+              </a:spcAft>
+              <a:buClr>
+                <a:schemeClr val="accent1"/>
+              </a:buClr>
+              <a:buFont typeface="Wingdings 2" charset="2"/>
+              <a:buChar char=""/>
+              <a:defRPr sz="1200" kern="1200">
+                <a:solidFill>
+                  <a:schemeClr val="tx1"/>
+                </a:solidFill>
+                <a:latin typeface="+mn-lt"/>
+                <a:ea typeface="+mn-ea"/>
+                <a:cs typeface="+mn-cs"/>
+              </a:defRPr>
+            </a:lvl9pPr>
+          </a:lstStyle>
+          <a:p>
+            <a:r>
+              <a:rPr lang="en-US" sz="1800" b="1" u="sng" dirty="0" err="1">
+                <a:solidFill>
+                  <a:srgbClr val="FFC000"/>
+                </a:solidFill>
+              </a:rPr>
+              <a:t>product_cat</a:t>
+            </a:r>
+            <a:r>
+              <a:rPr lang="en-US" sz="1800" b="1" dirty="0">
+                <a:solidFill>
+                  <a:srgbClr val="FFC000"/>
+                </a:solidFill>
+              </a:rPr>
+              <a:t> : </a:t>
+            </a:r>
+            <a:r>
+              <a:rPr lang="fr-FR" dirty="0" err="1"/>
+              <a:t>rationalized</a:t>
+            </a:r>
+            <a:r>
+              <a:rPr lang="fr-FR" dirty="0"/>
+              <a:t> </a:t>
+            </a:r>
+            <a:r>
+              <a:rPr lang="fr-FR" dirty="0" err="1"/>
+              <a:t>into</a:t>
+            </a:r>
+            <a:r>
+              <a:rPr lang="fr-FR" dirty="0"/>
+              <a:t> 15 </a:t>
+            </a:r>
+            <a:r>
+              <a:rPr lang="fr-FR" dirty="0" err="1"/>
+              <a:t>categories</a:t>
+            </a:r>
+            <a:endParaRPr lang="en-US" dirty="0"/>
+          </a:p>
+        </p:txBody>
+      </p:sp>
+      <p:sp>
+        <p:nvSpPr>
+          <p:cNvPr id="13" name="Espace réservé du contenu 2">
+            <a:extLst>
+              <a:ext uri="{FF2B5EF4-FFF2-40B4-BE49-F238E27FC236}">
+                <a16:creationId xmlns:a16="http://schemas.microsoft.com/office/drawing/2014/main" id="{FEAE2A0A-2132-4887-A187-51F7F63460EB}"/>
+              </a:ext>
+            </a:extLst>
+          </p:cNvPr>
+          <p:cNvSpPr txBox="1">
+            <a:spLocks/>
+          </p:cNvSpPr>
+          <p:nvPr/>
+        </p:nvSpPr>
+        <p:spPr>
+          <a:xfrm>
+            <a:off x="-68035" y="4314574"/>
+            <a:ext cx="11787580" cy="499369"/>
+          </a:xfrm>
+          <a:prstGeom prst="rect">
+            <a:avLst/>
+          </a:prstGeom>
+          <a:effectLst>
+            <a:outerShdw blurRad="50800" dir="14400000">
+              <a:srgbClr val="000000">
+                <a:alpha val="40000"/>
+              </a:srgbClr>
+            </a:outerShdw>
+          </a:effectLst>
+        </p:spPr>
+        <p:txBody>
+          <a:bodyPr vert="horz" lIns="91440" tIns="45720" rIns="91440" bIns="45720" rtlCol="0" anchor="ctr">
+            <a:normAutofit/>
+          </a:bodyPr>
+          <a:lstStyle>
+            <a:lvl1pPr marL="342900" indent="-342900" algn="l" defTabSz="457200" rtl="0" eaLnBrk="1" latinLnBrk="0" hangingPunct="1">
+              <a:spcBef>
+                <a:spcPct val="20000"/>
+              </a:spcBef>
+              <a:spcAft>
+                <a:spcPts val="600"/>
+              </a:spcAft>
+              <a:buClr>
+                <a:schemeClr val="accent1"/>
+              </a:buClr>
+              <a:buFont typeface="Wingdings 2" charset="2"/>
+              <a:buChar char=""/>
+              <a:defRPr sz="1800" kern="1200">
+                <a:solidFill>
+                  <a:schemeClr val="tx1"/>
+                </a:solidFill>
+                <a:latin typeface="+mn-lt"/>
+                <a:ea typeface="+mn-ea"/>
+                <a:cs typeface="+mn-cs"/>
+              </a:defRPr>
+            </a:lvl1pPr>
+            <a:lvl2pPr marL="742950" indent="-285750" algn="l" defTabSz="457200" rtl="0" eaLnBrk="1" latinLnBrk="0" hangingPunct="1">
+              <a:spcBef>
+                <a:spcPct val="20000"/>
+              </a:spcBef>
+              <a:spcAft>
+                <a:spcPts val="600"/>
+              </a:spcAft>
+              <a:buClr>
+                <a:schemeClr val="accent1"/>
+              </a:buClr>
+              <a:buFont typeface="Wingdings 2" charset="2"/>
+              <a:buChar char=""/>
+              <a:defRPr sz="1600" kern="1200">
+                <a:solidFill>
+                  <a:schemeClr val="tx1"/>
+                </a:solidFill>
+                <a:latin typeface="+mn-lt"/>
+                <a:ea typeface="+mn-ea"/>
+                <a:cs typeface="+mn-cs"/>
+              </a:defRPr>
+            </a:lvl2pPr>
+            <a:lvl3pPr marL="1143000" indent="-228600" algn="l" defTabSz="457200" rtl="0" eaLnBrk="1" latinLnBrk="0" hangingPunct="1">
+              <a:spcBef>
+                <a:spcPct val="20000"/>
+              </a:spcBef>
+              <a:spcAft>
+                <a:spcPts val="600"/>
+              </a:spcAft>
+              <a:buClr>
+                <a:schemeClr val="accent1"/>
+              </a:buClr>
+              <a:buFont typeface="Wingdings 2" charset="2"/>
+              <a:buChar char=""/>
+              <a:defRPr sz="1400" kern="1200">
+                <a:solidFill>
+                  <a:schemeClr val="tx1"/>
+                </a:solidFill>
+                <a:latin typeface="+mn-lt"/>
+                <a:ea typeface="+mn-ea"/>
+                <a:cs typeface="+mn-cs"/>
+              </a:defRPr>
+            </a:lvl3pPr>
+            <a:lvl4pPr marL="1600200" indent="-228600" algn="l" defTabSz="457200" rtl="0" eaLnBrk="1" latinLnBrk="0" hangingPunct="1">
+              <a:spcBef>
+                <a:spcPct val="20000"/>
+              </a:spcBef>
+              <a:spcAft>
+                <a:spcPts val="600"/>
+              </a:spcAft>
+              <a:buClr>
+                <a:schemeClr val="accent1"/>
+              </a:buClr>
+              <a:buFont typeface="Wingdings 2" charset="2"/>
+              <a:buChar char=""/>
+              <a:defRPr sz="1200" kern="1200">
+                <a:solidFill>
+                  <a:schemeClr val="tx1"/>
+                </a:solidFill>
+                <a:latin typeface="+mn-lt"/>
+                <a:ea typeface="+mn-ea"/>
+                <a:cs typeface="+mn-cs"/>
+              </a:defRPr>
+            </a:lvl4pPr>
+            <a:lvl5pPr marL="2057400" indent="-228600" algn="l" defTabSz="457200" rtl="0" eaLnBrk="1" latinLnBrk="0" hangingPunct="1">
+              <a:spcBef>
+                <a:spcPct val="20000"/>
+              </a:spcBef>
+              <a:spcAft>
+                <a:spcPts val="600"/>
+              </a:spcAft>
+              <a:buClr>
+                <a:schemeClr val="accent1"/>
+              </a:buClr>
+              <a:buFont typeface="Wingdings 2" charset="2"/>
+              <a:buChar char=""/>
+              <a:defRPr sz="1200" kern="1200">
+                <a:solidFill>
+                  <a:schemeClr val="tx1"/>
+                </a:solidFill>
+                <a:latin typeface="+mn-lt"/>
+                <a:ea typeface="+mn-ea"/>
+                <a:cs typeface="+mn-cs"/>
+              </a:defRPr>
+            </a:lvl5pPr>
+            <a:lvl6pPr marL="2400000" indent="-228600" algn="l" defTabSz="457200" rtl="0" eaLnBrk="1" latinLnBrk="0" hangingPunct="1">
+              <a:spcBef>
+                <a:spcPct val="20000"/>
+              </a:spcBef>
+              <a:spcAft>
+                <a:spcPts val="600"/>
+              </a:spcAft>
+              <a:buClr>
+                <a:schemeClr val="accent1"/>
+              </a:buClr>
+              <a:buFont typeface="Wingdings 2" charset="2"/>
+              <a:buChar char=""/>
+              <a:defRPr sz="1200" kern="1200">
+                <a:solidFill>
+                  <a:schemeClr val="tx1"/>
+                </a:solidFill>
+                <a:latin typeface="+mn-lt"/>
+                <a:ea typeface="+mn-ea"/>
+                <a:cs typeface="+mn-cs"/>
+              </a:defRPr>
+            </a:lvl6pPr>
+            <a:lvl7pPr marL="2800000" indent="-228600" algn="l" defTabSz="457200" rtl="0" eaLnBrk="1" latinLnBrk="0" hangingPunct="1">
+              <a:spcBef>
+                <a:spcPct val="20000"/>
+              </a:spcBef>
+              <a:spcAft>
+                <a:spcPts val="600"/>
+              </a:spcAft>
+              <a:buClr>
+                <a:schemeClr val="accent1"/>
+              </a:buClr>
+              <a:buFont typeface="Wingdings 2" charset="2"/>
+              <a:buChar char=""/>
+              <a:defRPr sz="1200" kern="1200">
+                <a:solidFill>
+                  <a:schemeClr val="tx1"/>
+                </a:solidFill>
+                <a:latin typeface="+mn-lt"/>
+                <a:ea typeface="+mn-ea"/>
+                <a:cs typeface="+mn-cs"/>
+              </a:defRPr>
+            </a:lvl7pPr>
+            <a:lvl8pPr marL="3200000" indent="-228600" algn="l" defTabSz="457200" rtl="0" eaLnBrk="1" latinLnBrk="0" hangingPunct="1">
+              <a:spcBef>
+                <a:spcPct val="20000"/>
+              </a:spcBef>
+              <a:spcAft>
+                <a:spcPts val="600"/>
+              </a:spcAft>
+              <a:buClr>
+                <a:schemeClr val="accent1"/>
+              </a:buClr>
+              <a:buFont typeface="Wingdings 2" charset="2"/>
+              <a:buChar char=""/>
+              <a:defRPr sz="1200" kern="1200">
+                <a:solidFill>
+                  <a:schemeClr val="tx1"/>
+                </a:solidFill>
+                <a:latin typeface="+mn-lt"/>
+                <a:ea typeface="+mn-ea"/>
+                <a:cs typeface="+mn-cs"/>
+              </a:defRPr>
+            </a:lvl8pPr>
+            <a:lvl9pPr marL="3600000" indent="-228600" algn="l" defTabSz="457200" rtl="0" eaLnBrk="1" latinLnBrk="0" hangingPunct="1">
+              <a:spcBef>
+                <a:spcPct val="20000"/>
+              </a:spcBef>
+              <a:spcAft>
+                <a:spcPts val="600"/>
+              </a:spcAft>
+              <a:buClr>
+                <a:schemeClr val="accent1"/>
+              </a:buClr>
+              <a:buFont typeface="Wingdings 2" charset="2"/>
+              <a:buChar char=""/>
+              <a:defRPr sz="1200" kern="1200">
+                <a:solidFill>
+                  <a:schemeClr val="tx1"/>
+                </a:solidFill>
+                <a:latin typeface="+mn-lt"/>
+                <a:ea typeface="+mn-ea"/>
+                <a:cs typeface="+mn-cs"/>
+              </a:defRPr>
+            </a:lvl9pPr>
+          </a:lstStyle>
+          <a:p>
+            <a:r>
+              <a:rPr lang="en-US" sz="1800" b="1" u="sng" dirty="0" err="1">
+                <a:solidFill>
+                  <a:srgbClr val="BD34D1"/>
+                </a:solidFill>
+              </a:rPr>
+              <a:t>review_gap</a:t>
+            </a:r>
+            <a:r>
+              <a:rPr lang="en-US" sz="1800" b="1" dirty="0">
+                <a:solidFill>
+                  <a:srgbClr val="BD34D1"/>
+                </a:solidFill>
+              </a:rPr>
+              <a:t> :</a:t>
+            </a:r>
+            <a:r>
+              <a:rPr lang="en-US" sz="1800" b="1" dirty="0"/>
+              <a:t> </a:t>
+            </a:r>
+            <a:r>
+              <a:rPr lang="en-US" sz="1800" dirty="0"/>
+              <a:t>value the gap between product and customer review</a:t>
+            </a:r>
+            <a:endParaRPr lang="en-US" dirty="0"/>
+          </a:p>
+        </p:txBody>
+      </p:sp>
     </p:spTree>
     <p:extLst>
       <p:ext uri="{BB962C8B-B14F-4D97-AF65-F5344CB8AC3E}">
@@ -17192,6 +18770,14 @@
               <a:rPr lang="fr-FR" dirty="0" err="1"/>
               <a:t>features</a:t>
             </a:r>
+            <a:r>
+              <a:rPr lang="fr-FR" dirty="0"/>
+              <a:t> &amp; </a:t>
+            </a:r>
+            <a:r>
+              <a:rPr lang="fr-FR" dirty="0" err="1"/>
+              <a:t>pre-processing</a:t>
+            </a:r>
             <a:endParaRPr lang="en-US" dirty="0"/>
           </a:p>
         </p:txBody>
@@ -17212,12 +18798,354 @@
             <p:ph idx="1"/>
           </p:nvPr>
         </p:nvSpPr>
-        <p:spPr/>
+        <p:spPr>
+          <a:xfrm>
+            <a:off x="637410" y="1925106"/>
+            <a:ext cx="10554574" cy="1346536"/>
+          </a:xfrm>
+        </p:spPr>
         <p:txBody>
           <a:bodyPr/>
           <a:lstStyle/>
           <a:p>
-            <a:endParaRPr lang="en-US"/>
+            <a:r>
+              <a:rPr lang="fr-FR" dirty="0"/>
+              <a:t>Put </a:t>
+            </a:r>
+            <a:r>
+              <a:rPr lang="fr-FR" dirty="0" err="1"/>
+              <a:t>here</a:t>
+            </a:r>
+            <a:r>
+              <a:rPr lang="fr-FR" dirty="0"/>
+              <a:t> the </a:t>
+            </a:r>
+            <a:r>
+              <a:rPr lang="fr-FR" dirty="0" err="1"/>
+              <a:t>heatmap</a:t>
+            </a:r>
+            <a:endParaRPr lang="en-US" dirty="0"/>
+          </a:p>
+        </p:txBody>
+      </p:sp>
+      <p:sp>
+        <p:nvSpPr>
+          <p:cNvPr id="4" name="Espace réservé du contenu 2">
+            <a:extLst>
+              <a:ext uri="{FF2B5EF4-FFF2-40B4-BE49-F238E27FC236}">
+                <a16:creationId xmlns:a16="http://schemas.microsoft.com/office/drawing/2014/main" id="{F4169435-64E4-4CF4-BB10-01E286263E83}"/>
+              </a:ext>
+            </a:extLst>
+          </p:cNvPr>
+          <p:cNvSpPr txBox="1">
+            <a:spLocks/>
+          </p:cNvSpPr>
+          <p:nvPr/>
+        </p:nvSpPr>
+        <p:spPr>
+          <a:xfrm>
+            <a:off x="637410" y="3745029"/>
+            <a:ext cx="10554574" cy="1346536"/>
+          </a:xfrm>
+          <a:prstGeom prst="rect">
+            <a:avLst/>
+          </a:prstGeom>
+          <a:effectLst>
+            <a:outerShdw blurRad="50800" dir="14400000">
+              <a:srgbClr val="000000">
+                <a:alpha val="40000"/>
+              </a:srgbClr>
+            </a:outerShdw>
+          </a:effectLst>
+        </p:spPr>
+        <p:txBody>
+          <a:bodyPr vert="horz" lIns="91440" tIns="45720" rIns="91440" bIns="45720" rtlCol="0" anchor="ctr">
+            <a:normAutofit/>
+          </a:bodyPr>
+          <a:lstStyle>
+            <a:lvl1pPr marL="342900" indent="-342900" algn="l" defTabSz="457200" rtl="0" eaLnBrk="1" latinLnBrk="0" hangingPunct="1">
+              <a:spcBef>
+                <a:spcPct val="20000"/>
+              </a:spcBef>
+              <a:spcAft>
+                <a:spcPts val="600"/>
+              </a:spcAft>
+              <a:buClr>
+                <a:schemeClr val="accent1"/>
+              </a:buClr>
+              <a:buFont typeface="Wingdings 2" charset="2"/>
+              <a:buChar char=""/>
+              <a:defRPr sz="1800" kern="1200">
+                <a:solidFill>
+                  <a:schemeClr val="tx1"/>
+                </a:solidFill>
+                <a:latin typeface="+mn-lt"/>
+                <a:ea typeface="+mn-ea"/>
+                <a:cs typeface="+mn-cs"/>
+              </a:defRPr>
+            </a:lvl1pPr>
+            <a:lvl2pPr marL="742950" indent="-285750" algn="l" defTabSz="457200" rtl="0" eaLnBrk="1" latinLnBrk="0" hangingPunct="1">
+              <a:spcBef>
+                <a:spcPct val="20000"/>
+              </a:spcBef>
+              <a:spcAft>
+                <a:spcPts val="600"/>
+              </a:spcAft>
+              <a:buClr>
+                <a:schemeClr val="accent1"/>
+              </a:buClr>
+              <a:buFont typeface="Wingdings 2" charset="2"/>
+              <a:buChar char=""/>
+              <a:defRPr sz="1600" kern="1200">
+                <a:solidFill>
+                  <a:schemeClr val="tx1"/>
+                </a:solidFill>
+                <a:latin typeface="+mn-lt"/>
+                <a:ea typeface="+mn-ea"/>
+                <a:cs typeface="+mn-cs"/>
+              </a:defRPr>
+            </a:lvl2pPr>
+            <a:lvl3pPr marL="1143000" indent="-228600" algn="l" defTabSz="457200" rtl="0" eaLnBrk="1" latinLnBrk="0" hangingPunct="1">
+              <a:spcBef>
+                <a:spcPct val="20000"/>
+              </a:spcBef>
+              <a:spcAft>
+                <a:spcPts val="600"/>
+              </a:spcAft>
+              <a:buClr>
+                <a:schemeClr val="accent1"/>
+              </a:buClr>
+              <a:buFont typeface="Wingdings 2" charset="2"/>
+              <a:buChar char=""/>
+              <a:defRPr sz="1400" kern="1200">
+                <a:solidFill>
+                  <a:schemeClr val="tx1"/>
+                </a:solidFill>
+                <a:latin typeface="+mn-lt"/>
+                <a:ea typeface="+mn-ea"/>
+                <a:cs typeface="+mn-cs"/>
+              </a:defRPr>
+            </a:lvl3pPr>
+            <a:lvl4pPr marL="1600200" indent="-228600" algn="l" defTabSz="457200" rtl="0" eaLnBrk="1" latinLnBrk="0" hangingPunct="1">
+              <a:spcBef>
+                <a:spcPct val="20000"/>
+              </a:spcBef>
+              <a:spcAft>
+                <a:spcPts val="600"/>
+              </a:spcAft>
+              <a:buClr>
+                <a:schemeClr val="accent1"/>
+              </a:buClr>
+              <a:buFont typeface="Wingdings 2" charset="2"/>
+              <a:buChar char=""/>
+              <a:defRPr sz="1200" kern="1200">
+                <a:solidFill>
+                  <a:schemeClr val="tx1"/>
+                </a:solidFill>
+                <a:latin typeface="+mn-lt"/>
+                <a:ea typeface="+mn-ea"/>
+                <a:cs typeface="+mn-cs"/>
+              </a:defRPr>
+            </a:lvl4pPr>
+            <a:lvl5pPr marL="2057400" indent="-228600" algn="l" defTabSz="457200" rtl="0" eaLnBrk="1" latinLnBrk="0" hangingPunct="1">
+              <a:spcBef>
+                <a:spcPct val="20000"/>
+              </a:spcBef>
+              <a:spcAft>
+                <a:spcPts val="600"/>
+              </a:spcAft>
+              <a:buClr>
+                <a:schemeClr val="accent1"/>
+              </a:buClr>
+              <a:buFont typeface="Wingdings 2" charset="2"/>
+              <a:buChar char=""/>
+              <a:defRPr sz="1200" kern="1200">
+                <a:solidFill>
+                  <a:schemeClr val="tx1"/>
+                </a:solidFill>
+                <a:latin typeface="+mn-lt"/>
+                <a:ea typeface="+mn-ea"/>
+                <a:cs typeface="+mn-cs"/>
+              </a:defRPr>
+            </a:lvl5pPr>
+            <a:lvl6pPr marL="2400000" indent="-228600" algn="l" defTabSz="457200" rtl="0" eaLnBrk="1" latinLnBrk="0" hangingPunct="1">
+              <a:spcBef>
+                <a:spcPct val="20000"/>
+              </a:spcBef>
+              <a:spcAft>
+                <a:spcPts val="600"/>
+              </a:spcAft>
+              <a:buClr>
+                <a:schemeClr val="accent1"/>
+              </a:buClr>
+              <a:buFont typeface="Wingdings 2" charset="2"/>
+              <a:buChar char=""/>
+              <a:defRPr sz="1200" kern="1200">
+                <a:solidFill>
+                  <a:schemeClr val="tx1"/>
+                </a:solidFill>
+                <a:latin typeface="+mn-lt"/>
+                <a:ea typeface="+mn-ea"/>
+                <a:cs typeface="+mn-cs"/>
+              </a:defRPr>
+            </a:lvl6pPr>
+            <a:lvl7pPr marL="2800000" indent="-228600" algn="l" defTabSz="457200" rtl="0" eaLnBrk="1" latinLnBrk="0" hangingPunct="1">
+              <a:spcBef>
+                <a:spcPct val="20000"/>
+              </a:spcBef>
+              <a:spcAft>
+                <a:spcPts val="600"/>
+              </a:spcAft>
+              <a:buClr>
+                <a:schemeClr val="accent1"/>
+              </a:buClr>
+              <a:buFont typeface="Wingdings 2" charset="2"/>
+              <a:buChar char=""/>
+              <a:defRPr sz="1200" kern="1200">
+                <a:solidFill>
+                  <a:schemeClr val="tx1"/>
+                </a:solidFill>
+                <a:latin typeface="+mn-lt"/>
+                <a:ea typeface="+mn-ea"/>
+                <a:cs typeface="+mn-cs"/>
+              </a:defRPr>
+            </a:lvl7pPr>
+            <a:lvl8pPr marL="3200000" indent="-228600" algn="l" defTabSz="457200" rtl="0" eaLnBrk="1" latinLnBrk="0" hangingPunct="1">
+              <a:spcBef>
+                <a:spcPct val="20000"/>
+              </a:spcBef>
+              <a:spcAft>
+                <a:spcPts val="600"/>
+              </a:spcAft>
+              <a:buClr>
+                <a:schemeClr val="accent1"/>
+              </a:buClr>
+              <a:buFont typeface="Wingdings 2" charset="2"/>
+              <a:buChar char=""/>
+              <a:defRPr sz="1200" kern="1200">
+                <a:solidFill>
+                  <a:schemeClr val="tx1"/>
+                </a:solidFill>
+                <a:latin typeface="+mn-lt"/>
+                <a:ea typeface="+mn-ea"/>
+                <a:cs typeface="+mn-cs"/>
+              </a:defRPr>
+            </a:lvl8pPr>
+            <a:lvl9pPr marL="3600000" indent="-228600" algn="l" defTabSz="457200" rtl="0" eaLnBrk="1" latinLnBrk="0" hangingPunct="1">
+              <a:spcBef>
+                <a:spcPct val="20000"/>
+              </a:spcBef>
+              <a:spcAft>
+                <a:spcPts val="600"/>
+              </a:spcAft>
+              <a:buClr>
+                <a:schemeClr val="accent1"/>
+              </a:buClr>
+              <a:buFont typeface="Wingdings 2" charset="2"/>
+              <a:buChar char=""/>
+              <a:defRPr sz="1200" kern="1200">
+                <a:solidFill>
+                  <a:schemeClr val="tx1"/>
+                </a:solidFill>
+                <a:latin typeface="+mn-lt"/>
+                <a:ea typeface="+mn-ea"/>
+                <a:cs typeface="+mn-cs"/>
+              </a:defRPr>
+            </a:lvl9pPr>
+          </a:lstStyle>
+          <a:p>
+            <a:r>
+              <a:rPr lang="fr-FR" dirty="0" err="1"/>
+              <a:t>Discuss</a:t>
+            </a:r>
+            <a:r>
+              <a:rPr lang="fr-FR" dirty="0"/>
+              <a:t> the issues </a:t>
+            </a:r>
+            <a:r>
+              <a:rPr lang="fr-FR" dirty="0" err="1"/>
+              <a:t>raised</a:t>
+            </a:r>
+            <a:r>
+              <a:rPr lang="fr-FR" dirty="0"/>
+              <a:t> about the model </a:t>
+            </a:r>
+            <a:r>
+              <a:rPr lang="fr-FR" dirty="0" err="1"/>
+              <a:t>sensitivity</a:t>
+            </a:r>
+            <a:r>
+              <a:rPr lang="fr-FR" dirty="0"/>
+              <a:t> :</a:t>
+            </a:r>
+          </a:p>
+          <a:p>
+            <a:pPr lvl="1"/>
+            <a:r>
+              <a:rPr lang="fr-FR" dirty="0" err="1"/>
+              <a:t>Why</a:t>
+            </a:r>
+            <a:r>
+              <a:rPr lang="fr-FR" dirty="0"/>
+              <a:t> a </a:t>
+            </a:r>
+            <a:r>
+              <a:rPr lang="fr-FR" dirty="0" err="1"/>
+              <a:t>boolean</a:t>
+            </a:r>
+            <a:r>
+              <a:rPr lang="fr-FR" dirty="0"/>
+              <a:t> </a:t>
+            </a:r>
+            <a:r>
+              <a:rPr lang="fr-FR" dirty="0" err="1"/>
+              <a:t>feature</a:t>
+            </a:r>
+            <a:r>
+              <a:rPr lang="fr-FR" dirty="0"/>
+              <a:t> </a:t>
+            </a:r>
+            <a:r>
+              <a:rPr lang="fr-FR" dirty="0" err="1"/>
+              <a:t>takes</a:t>
+            </a:r>
+            <a:r>
+              <a:rPr lang="fr-FR" dirty="0"/>
+              <a:t> the lead, </a:t>
+            </a:r>
+            <a:r>
+              <a:rPr lang="fr-FR" dirty="0" err="1"/>
+              <a:t>is</a:t>
+            </a:r>
+            <a:r>
+              <a:rPr lang="fr-FR" dirty="0"/>
+              <a:t> </a:t>
+            </a:r>
+            <a:r>
+              <a:rPr lang="fr-FR" dirty="0" err="1"/>
+              <a:t>it</a:t>
+            </a:r>
+            <a:r>
+              <a:rPr lang="fr-FR" dirty="0"/>
+              <a:t> right to </a:t>
+            </a:r>
+            <a:r>
+              <a:rPr lang="fr-FR" dirty="0" err="1"/>
+              <a:t>remedy</a:t>
+            </a:r>
+            <a:r>
+              <a:rPr lang="fr-FR" dirty="0"/>
+              <a:t> </a:t>
+            </a:r>
+            <a:r>
+              <a:rPr lang="fr-FR" dirty="0" err="1"/>
+              <a:t>this</a:t>
+            </a:r>
+            <a:r>
+              <a:rPr lang="fr-FR" dirty="0"/>
+              <a:t>, and how</a:t>
+            </a:r>
+            <a:endParaRPr lang="en-US" dirty="0"/>
           </a:p>
         </p:txBody>
       </p:sp>

</xml_diff>